<commit_message>
Upgrade tabular form for quote & book collections.
</commit_message>
<xml_diff>
--- a/MyCollection.pptx
+++ b/MyCollection.pptx
@@ -5,7 +5,7 @@
     <p:sldMasterId id="2147483648" r:id="rId1"/>
   </p:sldMasterIdLst>
   <p:notesMasterIdLst>
-    <p:notesMasterId r:id="rId11"/>
+    <p:notesMasterId r:id="rId12"/>
   </p:notesMasterIdLst>
   <p:sldIdLst>
     <p:sldId id="256" r:id="rId2"/>
@@ -16,7 +16,8 @@
     <p:sldId id="262" r:id="rId7"/>
     <p:sldId id="263" r:id="rId8"/>
     <p:sldId id="264" r:id="rId9"/>
-    <p:sldId id="265" r:id="rId10"/>
+    <p:sldId id="266" r:id="rId10"/>
+    <p:sldId id="265" r:id="rId11"/>
   </p:sldIdLst>
   <p:sldSz cx="12192000" cy="6858000"/>
   <p:notesSz cx="6858000" cy="9144000"/>
@@ -205,7 +206,7 @@
           <a:p>
             <a:fld id="{AD585424-E52D-4C27-95E7-BEFE3A48CBED}" type="datetimeFigureOut">
               <a:rPr lang="en-US" smtClean="0"/>
-              <a:t>3/22/22</a:t>
+              <a:t>3/24/22</a:t>
             </a:fld>
             <a:endParaRPr lang="en-US"/>
           </a:p>
@@ -3467,6 +3468,144 @@
 </p:sld>
 </file>
 
+<file path=ppt/slides/slide10.xml><?xml version="1.0" encoding="utf-8"?>
+<p:sld xmlns:a="http://schemas.openxmlformats.org/drawingml/2006/main" xmlns:r="http://schemas.openxmlformats.org/officeDocument/2006/relationships" xmlns:p="http://schemas.openxmlformats.org/presentationml/2006/main">
+  <p:cSld>
+    <p:spTree>
+      <p:nvGrpSpPr>
+        <p:cNvPr id="1" name=""/>
+        <p:cNvGrpSpPr/>
+        <p:nvPr/>
+      </p:nvGrpSpPr>
+      <p:grpSpPr>
+        <a:xfrm>
+          <a:off x="0" y="0"/>
+          <a:ext cx="0" cy="0"/>
+          <a:chOff x="0" y="0"/>
+          <a:chExt cx="0" cy="0"/>
+        </a:xfrm>
+      </p:grpSpPr>
+      <p:sp>
+        <p:nvSpPr>
+          <p:cNvPr id="2" name="Title 1"/>
+          <p:cNvSpPr>
+            <a:spLocks noGrp="1"/>
+          </p:cNvSpPr>
+          <p:nvPr>
+            <p:ph type="title"/>
+          </p:nvPr>
+        </p:nvSpPr>
+        <p:spPr/>
+        <p:txBody>
+          <a:bodyPr/>
+          <a:lstStyle/>
+          <a:p>
+            <a:endParaRPr lang="en-US"/>
+          </a:p>
+        </p:txBody>
+      </p:sp>
+      <p:sp>
+        <p:nvSpPr>
+          <p:cNvPr id="3" name="Content Placeholder 2"/>
+          <p:cNvSpPr>
+            <a:spLocks noGrp="1"/>
+          </p:cNvSpPr>
+          <p:nvPr>
+            <p:ph idx="1"/>
+          </p:nvPr>
+        </p:nvSpPr>
+        <p:spPr/>
+        <p:txBody>
+          <a:bodyPr/>
+          <a:lstStyle/>
+          <a:p>
+            <a:pPr marL="0" indent="0" algn="ctr">
+              <a:buNone/>
+            </a:pPr>
+            <a:r>
+              <a:rPr lang="en-US" sz="8000" dirty="0" smtClean="0">
+                <a:solidFill>
+                  <a:srgbClr val="0070C0"/>
+                </a:solidFill>
+                <a:latin typeface="Algerian" panose="04020705040A02060702" pitchFamily="82" charset="0"/>
+              </a:rPr>
+              <a:t>Thank you.</a:t>
+            </a:r>
+            <a:endParaRPr lang="en-US" sz="8000" dirty="0">
+              <a:solidFill>
+                <a:srgbClr val="0070C0"/>
+              </a:solidFill>
+              <a:latin typeface="Algerian" panose="04020705040A02060702" pitchFamily="82" charset="0"/>
+            </a:endParaRPr>
+          </a:p>
+        </p:txBody>
+      </p:sp>
+      <p:sp>
+        <p:nvSpPr>
+          <p:cNvPr id="4" name="Date Placeholder 3"/>
+          <p:cNvSpPr>
+            <a:spLocks noGrp="1"/>
+          </p:cNvSpPr>
+          <p:nvPr>
+            <p:ph type="dt" sz="half" idx="10"/>
+          </p:nvPr>
+        </p:nvSpPr>
+        <p:spPr/>
+        <p:txBody>
+          <a:bodyPr/>
+          <a:lstStyle/>
+          <a:p>
+            <a:r>
+              <a:rPr lang="en-US" smtClean="0"/>
+              <a:t>3/22/22</a:t>
+            </a:r>
+            <a:endParaRPr lang="en-US"/>
+          </a:p>
+        </p:txBody>
+      </p:sp>
+      <p:sp>
+        <p:nvSpPr>
+          <p:cNvPr id="5" name="Footer Placeholder 4"/>
+          <p:cNvSpPr>
+            <a:spLocks noGrp="1"/>
+          </p:cNvSpPr>
+          <p:nvPr>
+            <p:ph type="ftr" sz="quarter" idx="11"/>
+          </p:nvPr>
+        </p:nvSpPr>
+        <p:spPr/>
+        <p:txBody>
+          <a:bodyPr/>
+          <a:lstStyle/>
+          <a:p>
+            <a:r>
+              <a:rPr lang="en-US" smtClean="0"/>
+              <a:t>Author: Joseph Tran</a:t>
+            </a:r>
+            <a:endParaRPr lang="en-US"/>
+          </a:p>
+        </p:txBody>
+      </p:sp>
+    </p:spTree>
+    <p:extLst>
+      <p:ext uri="{BB962C8B-B14F-4D97-AF65-F5344CB8AC3E}">
+        <p14:creationId xmlns:p14="http://schemas.microsoft.com/office/powerpoint/2010/main" val="3071674867"/>
+      </p:ext>
+    </p:extLst>
+  </p:cSld>
+  <p:clrMapOvr>
+    <a:masterClrMapping/>
+  </p:clrMapOvr>
+  <p:timing>
+    <p:tnLst>
+      <p:par>
+        <p:cTn id="1" dur="indefinite" restart="never" nodeType="tmRoot"/>
+      </p:par>
+    </p:tnLst>
+  </p:timing>
+</p:sld>
+</file>
+
 <file path=ppt/slides/slide2.xml><?xml version="1.0" encoding="utf-8"?>
 <p:sld xmlns:a="http://schemas.openxmlformats.org/drawingml/2006/main" xmlns:r="http://schemas.openxmlformats.org/officeDocument/2006/relationships" xmlns:p="http://schemas.openxmlformats.org/presentationml/2006/main">
   <p:cSld>
@@ -3764,9 +3903,16 @@
             <p:ph idx="1"/>
           </p:nvPr>
         </p:nvSpPr>
-        <p:spPr/>
-        <p:txBody>
-          <a:bodyPr/>
+        <p:spPr>
+          <a:xfrm>
+            <a:off x="838199" y="1846218"/>
+            <a:ext cx="7565571" cy="4420440"/>
+          </a:xfrm>
+        </p:spPr>
+        <p:txBody>
+          <a:bodyPr>
+            <a:normAutofit/>
+          </a:bodyPr>
           <a:lstStyle/>
           <a:p>
             <a:r>
@@ -3809,38 +3955,20 @@
               <a:buNone/>
             </a:pPr>
             <a:r>
-              <a:rPr lang="en-US" i="1" dirty="0" smtClean="0"/>
-              <a:t>(a famous Polish writer in the turn of the 20</a:t>
-            </a:r>
-            <a:r>
-              <a:rPr lang="en-US" i="1" baseline="30000" dirty="0" smtClean="0"/>
-              <a:t>th</a:t>
-            </a:r>
-            <a:r>
-              <a:rPr lang="en-US" i="1" dirty="0" smtClean="0"/>
-              <a:t> century)</a:t>
-            </a:r>
+              <a:rPr lang="en-US" sz="2100" dirty="0" smtClean="0"/>
+              <a:t>The story of the love that develops between a young Christian woman and a Roman officer who, after meeting her fellow Christians, converts to her religion.</a:t>
+            </a:r>
+          </a:p>
+          <a:p>
+            <a:pPr marL="457200" lvl="1" indent="0">
+              <a:buNone/>
+            </a:pPr>
+            <a:endParaRPr lang="en-US" sz="2100" dirty="0" smtClean="0"/>
           </a:p>
           <a:p>
             <a:pPr lvl="1"/>
-            <a:endParaRPr lang="en-US" dirty="0"/>
-          </a:p>
-          <a:p>
-            <a:pPr lvl="1"/>
-            <a:endParaRPr lang="en-US" dirty="0" smtClean="0"/>
-          </a:p>
-          <a:p>
-            <a:pPr lvl="1"/>
-            <a:endParaRPr lang="en-US" dirty="0"/>
-          </a:p>
-          <a:p>
-            <a:pPr lvl="1"/>
-            <a:endParaRPr lang="en-US" dirty="0" smtClean="0"/>
-          </a:p>
-          <a:p>
-            <a:pPr lvl="1"/>
-            <a:r>
-              <a:rPr lang="en-US" sz="3600" dirty="0">
+            <a:r>
+              <a:rPr lang="en-US" sz="3600" dirty="0" smtClean="0">
                 <a:solidFill>
                   <a:schemeClr val="accent5">
                     <a:lumMod val="75000"/>
@@ -3895,18 +4023,18 @@
               <a:buNone/>
             </a:pPr>
             <a:r>
-              <a:rPr lang="en-US" i="1" dirty="0" smtClean="0"/>
-              <a:t>			(a popular French writer in the 19</a:t>
-            </a:r>
-            <a:r>
-              <a:rPr lang="en-US" i="1" baseline="30000" dirty="0" smtClean="0"/>
-              <a:t>th</a:t>
-            </a:r>
-            <a:r>
-              <a:rPr lang="en-US" i="1" dirty="0" smtClean="0"/>
-              <a:t> century)</a:t>
-            </a:r>
-            <a:endParaRPr lang="en-US" i="1" dirty="0"/>
+              <a:rPr lang="en-US" sz="2100" dirty="0"/>
+              <a:t>The story tells about an adventurous adventure of </a:t>
+            </a:r>
+            <a:r>
+              <a:rPr lang="en-US" sz="2100" dirty="0" err="1"/>
+              <a:t>Rémi</a:t>
+            </a:r>
+            <a:r>
+              <a:rPr lang="en-US" sz="2100" dirty="0"/>
+              <a:t> - a boy with no parents, no relatives who live with his adoptive mother in a remote countryside.</a:t>
+            </a:r>
+            <a:endParaRPr lang="en-US" sz="2100" dirty="0" smtClean="0"/>
           </a:p>
         </p:txBody>
       </p:sp>
@@ -4008,7 +4136,7 @@
         </p:blipFill>
         <p:spPr>
           <a:xfrm>
-            <a:off x="8153400" y="1455551"/>
+            <a:off x="8240488" y="776282"/>
             <a:ext cx="2054352" cy="3352800"/>
           </a:xfrm>
           <a:prstGeom prst="rect">
@@ -4858,7 +4986,7 @@
           <a:p>
             <a:r>
               <a:rPr lang="en-US" dirty="0" smtClean="0"/>
-              <a:t>Using the NYT API to retrieve the list of best sellers books from their data and choosing which ones you love.</a:t>
+              <a:t>Using the NYT API to retrieve the list of best sellers books. You can choose which ones you love.</a:t>
             </a:r>
           </a:p>
           <a:p>
@@ -5113,42 +5241,26 @@
           <a:bodyPr/>
           <a:lstStyle/>
           <a:p>
-            <a:endParaRPr lang="en-US"/>
-          </a:p>
-        </p:txBody>
-      </p:sp>
-      <p:sp>
-        <p:nvSpPr>
-          <p:cNvPr id="3" name="Content Placeholder 2"/>
-          <p:cNvSpPr>
-            <a:spLocks noGrp="1"/>
-          </p:cNvSpPr>
-          <p:nvPr>
-            <p:ph idx="1"/>
-          </p:nvPr>
-        </p:nvSpPr>
-        <p:spPr/>
-        <p:txBody>
-          <a:bodyPr/>
-          <a:lstStyle/>
-          <a:p>
-            <a:pPr marL="0" indent="0" algn="ctr">
-              <a:buNone/>
-            </a:pPr>
-            <a:r>
-              <a:rPr lang="en-US" sz="8000" dirty="0" smtClean="0">
+            <a:r>
+              <a:rPr lang="en-US" dirty="0" smtClean="0">
                 <a:solidFill>
                   <a:srgbClr val="0070C0"/>
                 </a:solidFill>
-                <a:latin typeface="Algerian" panose="04020705040A02060702" pitchFamily="82" charset="0"/>
               </a:rPr>
-              <a:t>Thank you.</a:t>
-            </a:r>
-            <a:endParaRPr lang="en-US" sz="8000" dirty="0">
+              <a:t>Next Step for My </a:t>
+            </a:r>
+            <a:r>
+              <a:rPr lang="en-US" dirty="0" smtClean="0">
+                <a:solidFill>
+                  <a:srgbClr val="0070C0"/>
+                </a:solidFill>
+              </a:rPr>
+              <a:t>Collection website</a:t>
+            </a:r>
+            <a:endParaRPr lang="en-US" dirty="0">
               <a:solidFill>
                 <a:srgbClr val="0070C0"/>
               </a:solidFill>
-              <a:latin typeface="Algerian" panose="04020705040A02060702" pitchFamily="82" charset="0"/>
             </a:endParaRPr>
           </a:p>
         </p:txBody>
@@ -5196,13 +5308,48 @@
               <a:t>Author: Joseph Tran</a:t>
             </a:r>
             <a:endParaRPr lang="en-US"/>
+          </a:p>
+        </p:txBody>
+      </p:sp>
+      <p:sp>
+        <p:nvSpPr>
+          <p:cNvPr id="6" name="Content Placeholder 5"/>
+          <p:cNvSpPr>
+            <a:spLocks noGrp="1"/>
+          </p:cNvSpPr>
+          <p:nvPr>
+            <p:ph idx="1"/>
+          </p:nvPr>
+        </p:nvSpPr>
+        <p:spPr/>
+        <p:txBody>
+          <a:bodyPr/>
+          <a:lstStyle/>
+          <a:p>
+            <a:r>
+              <a:rPr lang="en-US" dirty="0" smtClean="0"/>
+              <a:t>Using database (MySQL, SQL Server, MongoDB, etc.) instead of local storage to store data.</a:t>
+            </a:r>
+          </a:p>
+          <a:p>
+            <a:r>
+              <a:rPr lang="en-US" dirty="0" smtClean="0"/>
+              <a:t>Redesign for both PCs and mobile devices</a:t>
+            </a:r>
+            <a:endParaRPr lang="en-US" dirty="0" smtClean="0"/>
+          </a:p>
+          <a:p>
+            <a:pPr marL="0" indent="0">
+              <a:buNone/>
+            </a:pPr>
+            <a:endParaRPr lang="en-US" dirty="0"/>
           </a:p>
         </p:txBody>
       </p:sp>
     </p:spTree>
     <p:extLst>
       <p:ext uri="{BB962C8B-B14F-4D97-AF65-F5344CB8AC3E}">
-        <p14:creationId xmlns:p14="http://schemas.microsoft.com/office/powerpoint/2010/main" val="3071674867"/>
+        <p14:creationId xmlns:p14="http://schemas.microsoft.com/office/powerpoint/2010/main" val="3261097860"/>
       </p:ext>
     </p:extLst>
   </p:cSld>

</xml_diff>